<commit_message>
append HC AI middleware
</commit_message>
<xml_diff>
--- a/images/materials.pptx
+++ b/images/materials.pptx
@@ -7,6 +7,7 @@
   <p:sldIdLst>
     <p:sldId id="256" r:id="rId2"/>
     <p:sldId id="257" r:id="rId3"/>
+    <p:sldId id="258" r:id="rId4"/>
   </p:sldIdLst>
   <p:sldSz cx="12192000" cy="6858000"/>
   <p:notesSz cx="6858000" cy="9144000"/>
@@ -6351,6 +6352,635 @@
 </p:sld>
 </file>
 
+<file path=ppt/slides/slide3.xml><?xml version="1.0" encoding="utf-8"?>
+<p:sld xmlns:a="http://schemas.openxmlformats.org/drawingml/2006/main" xmlns:r="http://schemas.openxmlformats.org/officeDocument/2006/relationships" xmlns:p="http://schemas.openxmlformats.org/presentationml/2006/main">
+  <p:cSld>
+    <p:spTree>
+      <p:nvGrpSpPr>
+        <p:cNvPr id="1" name=""/>
+        <p:cNvGrpSpPr/>
+        <p:nvPr/>
+      </p:nvGrpSpPr>
+      <p:grpSpPr>
+        <a:xfrm>
+          <a:off x="0" y="0"/>
+          <a:ext cx="0" cy="0"/>
+          <a:chOff x="0" y="0"/>
+          <a:chExt cx="0" cy="0"/>
+        </a:xfrm>
+      </p:grpSpPr>
+      <p:sp>
+        <p:nvSpPr>
+          <p:cNvPr id="2" name="右矢印 1"/>
+          <p:cNvSpPr/>
+          <p:nvPr/>
+        </p:nvSpPr>
+        <p:spPr>
+          <a:xfrm rot="18061408">
+            <a:off x="1461963" y="1318174"/>
+            <a:ext cx="921235" cy="1688710"/>
+          </a:xfrm>
+          <a:prstGeom prst="rightArrow">
+            <a:avLst>
+              <a:gd name="adj1" fmla="val 50000"/>
+              <a:gd name="adj2" fmla="val 45181"/>
+            </a:avLst>
+          </a:prstGeom>
+        </p:spPr>
+        <p:style>
+          <a:lnRef idx="2">
+            <a:schemeClr val="accent4">
+              <a:shade val="50000"/>
+            </a:schemeClr>
+          </a:lnRef>
+          <a:fillRef idx="1">
+            <a:schemeClr val="accent4"/>
+          </a:fillRef>
+          <a:effectRef idx="0">
+            <a:schemeClr val="accent4"/>
+          </a:effectRef>
+          <a:fontRef idx="minor">
+            <a:schemeClr val="lt1"/>
+          </a:fontRef>
+        </p:style>
+        <p:txBody>
+          <a:bodyPr rtlCol="0" anchor="ctr"/>
+          <a:lstStyle/>
+          <a:p>
+            <a:pPr algn="ctr"/>
+            <a:endParaRPr kumimoji="1" lang="ja-JP" altLang="en-US"/>
+          </a:p>
+        </p:txBody>
+      </p:sp>
+      <p:grpSp>
+        <p:nvGrpSpPr>
+          <p:cNvPr id="3" name="グループ化 2"/>
+          <p:cNvGrpSpPr/>
+          <p:nvPr/>
+        </p:nvGrpSpPr>
+        <p:grpSpPr>
+          <a:xfrm>
+            <a:off x="390299" y="3261635"/>
+            <a:ext cx="1960241" cy="1461510"/>
+            <a:chOff x="51333" y="1730870"/>
+            <a:chExt cx="1960241" cy="1461510"/>
+          </a:xfrm>
+        </p:grpSpPr>
+        <p:pic>
+          <p:nvPicPr>
+            <p:cNvPr id="4" name="Picture 12" descr="ãç+çç»åãã®ç»åæ¤ç´¢çµæ"/>
+            <p:cNvPicPr>
+              <a:picLocks noChangeAspect="1" noChangeArrowheads="1"/>
+            </p:cNvPicPr>
+            <p:nvPr/>
+          </p:nvPicPr>
+          <p:blipFill>
+            <a:blip r:embed="rId2" cstate="print">
+              <a:extLst>
+                <a:ext uri="{28A0092B-C50C-407E-A947-70E740481C1C}">
+                  <a14:useLocalDpi xmlns:a14="http://schemas.microsoft.com/office/drawing/2010/main" val="0"/>
+                </a:ext>
+              </a:extLst>
+            </a:blip>
+            <a:srcRect/>
+            <a:stretch>
+              <a:fillRect/>
+            </a:stretch>
+          </p:blipFill>
+          <p:spPr bwMode="auto">
+            <a:xfrm>
+              <a:off x="51333" y="1948202"/>
+              <a:ext cx="1707302" cy="859621"/>
+            </a:xfrm>
+            <a:prstGeom prst="rect">
+              <a:avLst/>
+            </a:prstGeom>
+            <a:noFill/>
+            <a:extLst>
+              <a:ext uri="{909E8E84-426E-40DD-AFC4-6F175D3DCCD1}">
+                <a14:hiddenFill xmlns:a14="http://schemas.microsoft.com/office/drawing/2010/main">
+                  <a:solidFill>
+                    <a:srgbClr val="FFFFFF"/>
+                  </a:solidFill>
+                </a14:hiddenFill>
+              </a:ext>
+            </a:extLst>
+          </p:spPr>
+        </p:pic>
+        <p:pic>
+          <p:nvPicPr>
+            <p:cNvPr id="5" name="Picture 16" descr="ããªãªã³ããã¯ ä¸­ç¶ 4K ã«ã¡ã©ãã®ç»åæ¤ç´¢çµæ"/>
+            <p:cNvPicPr>
+              <a:picLocks noChangeAspect="1" noChangeArrowheads="1"/>
+            </p:cNvPicPr>
+            <p:nvPr/>
+          </p:nvPicPr>
+          <p:blipFill>
+            <a:blip r:embed="rId3" cstate="print">
+              <a:extLst>
+                <a:ext uri="{28A0092B-C50C-407E-A947-70E740481C1C}">
+                  <a14:useLocalDpi xmlns:a14="http://schemas.microsoft.com/office/drawing/2010/main" val="0"/>
+                </a:ext>
+              </a:extLst>
+            </a:blip>
+            <a:srcRect/>
+            <a:stretch>
+              <a:fillRect/>
+            </a:stretch>
+          </p:blipFill>
+          <p:spPr bwMode="auto">
+            <a:xfrm>
+              <a:off x="539773" y="1730870"/>
+              <a:ext cx="1268037" cy="951651"/>
+            </a:xfrm>
+            <a:prstGeom prst="rect">
+              <a:avLst/>
+            </a:prstGeom>
+            <a:noFill/>
+            <a:extLst>
+              <a:ext uri="{909E8E84-426E-40DD-AFC4-6F175D3DCCD1}">
+                <a14:hiddenFill xmlns:a14="http://schemas.microsoft.com/office/drawing/2010/main">
+                  <a:solidFill>
+                    <a:srgbClr val="FFFFFF"/>
+                  </a:solidFill>
+                </a14:hiddenFill>
+              </a:ext>
+            </a:extLst>
+          </p:spPr>
+        </p:pic>
+        <p:pic>
+          <p:nvPicPr>
+            <p:cNvPr id="6" name="Picture 14" descr="ãã°ã¼ã°ã«ããã ç»å±± æ®å½±ãã®ç»åæ¤ç´¢çµæ"/>
+            <p:cNvPicPr>
+              <a:picLocks noChangeAspect="1" noChangeArrowheads="1"/>
+            </p:cNvPicPr>
+            <p:nvPr/>
+          </p:nvPicPr>
+          <p:blipFill rotWithShape="1">
+            <a:blip r:embed="rId4" cstate="print">
+              <a:extLst>
+                <a:ext uri="{28A0092B-C50C-407E-A947-70E740481C1C}">
+                  <a14:useLocalDpi xmlns:a14="http://schemas.microsoft.com/office/drawing/2010/main" val="0"/>
+                </a:ext>
+              </a:extLst>
+            </a:blip>
+            <a:srcRect l="38253" t="14104" r="33688" b="32249"/>
+            <a:stretch/>
+          </p:blipFill>
+          <p:spPr bwMode="auto">
+            <a:xfrm>
+              <a:off x="283647" y="2566600"/>
+              <a:ext cx="581866" cy="625780"/>
+            </a:xfrm>
+            <a:prstGeom prst="rect">
+              <a:avLst/>
+            </a:prstGeom>
+            <a:noFill/>
+            <a:extLst>
+              <a:ext uri="{909E8E84-426E-40DD-AFC4-6F175D3DCCD1}">
+                <a14:hiddenFill xmlns:a14="http://schemas.microsoft.com/office/drawing/2010/main">
+                  <a:solidFill>
+                    <a:srgbClr val="FFFFFF"/>
+                  </a:solidFill>
+                </a14:hiddenFill>
+              </a:ext>
+            </a:extLst>
+          </p:spPr>
+        </p:pic>
+        <p:pic>
+          <p:nvPicPr>
+            <p:cNvPr id="7" name="Picture 8" descr="é¢é£ç»å"/>
+            <p:cNvPicPr>
+              <a:picLocks noChangeAspect="1" noChangeArrowheads="1"/>
+            </p:cNvPicPr>
+            <p:nvPr/>
+          </p:nvPicPr>
+          <p:blipFill>
+            <a:blip r:embed="rId5" cstate="print">
+              <a:extLst>
+                <a:ext uri="{28A0092B-C50C-407E-A947-70E740481C1C}">
+                  <a14:useLocalDpi xmlns:a14="http://schemas.microsoft.com/office/drawing/2010/main" val="0"/>
+                </a:ext>
+              </a:extLst>
+            </a:blip>
+            <a:srcRect/>
+            <a:stretch>
+              <a:fillRect/>
+            </a:stretch>
+          </p:blipFill>
+          <p:spPr bwMode="auto">
+            <a:xfrm>
+              <a:off x="865512" y="2297521"/>
+              <a:ext cx="1146062" cy="804034"/>
+            </a:xfrm>
+            <a:prstGeom prst="rect">
+              <a:avLst/>
+            </a:prstGeom>
+            <a:noFill/>
+            <a:extLst>
+              <a:ext uri="{909E8E84-426E-40DD-AFC4-6F175D3DCCD1}">
+                <a14:hiddenFill xmlns:a14="http://schemas.microsoft.com/office/drawing/2010/main">
+                  <a:solidFill>
+                    <a:srgbClr val="FFFFFF"/>
+                  </a:solidFill>
+                </a14:hiddenFill>
+              </a:ext>
+            </a:extLst>
+          </p:spPr>
+        </p:pic>
+      </p:grpSp>
+      <p:pic>
+        <p:nvPicPr>
+          <p:cNvPr id="8" name="Picture 2" descr="ãArduino nanoãã®ç»åæ¤ç´¢çµæ"/>
+          <p:cNvPicPr>
+            <a:picLocks noChangeAspect="1" noChangeArrowheads="1"/>
+          </p:cNvPicPr>
+          <p:nvPr/>
+        </p:nvPicPr>
+        <p:blipFill>
+          <a:blip r:embed="rId6" cstate="print">
+            <a:extLst>
+              <a:ext uri="{28A0092B-C50C-407E-A947-70E740481C1C}">
+                <a14:useLocalDpi xmlns:a14="http://schemas.microsoft.com/office/drawing/2010/main" val="0"/>
+              </a:ext>
+            </a:extLst>
+          </a:blip>
+          <a:srcRect/>
+          <a:stretch>
+            <a:fillRect/>
+          </a:stretch>
+        </p:blipFill>
+        <p:spPr bwMode="auto">
+          <a:xfrm>
+            <a:off x="5150281" y="2902372"/>
+            <a:ext cx="925853" cy="693738"/>
+          </a:xfrm>
+          <a:prstGeom prst="rect">
+            <a:avLst/>
+          </a:prstGeom>
+          <a:noFill/>
+          <a:extLst>
+            <a:ext uri="{909E8E84-426E-40DD-AFC4-6F175D3DCCD1}">
+              <a14:hiddenFill xmlns:a14="http://schemas.microsoft.com/office/drawing/2010/main">
+                <a:solidFill>
+                  <a:srgbClr val="FFFFFF"/>
+                </a:solidFill>
+              </a14:hiddenFill>
+            </a:ext>
+          </a:extLst>
+        </p:spPr>
+      </p:pic>
+      <p:pic>
+        <p:nvPicPr>
+          <p:cNvPr id="9" name="Picture 10" descr="ãèªåéè»¢ãã®ç»åæ¤ç´¢çµæ"/>
+          <p:cNvPicPr>
+            <a:picLocks noChangeAspect="1" noChangeArrowheads="1"/>
+          </p:cNvPicPr>
+          <p:nvPr/>
+        </p:nvPicPr>
+        <p:blipFill rotWithShape="1">
+          <a:blip r:embed="rId7" cstate="print">
+            <a:extLst>
+              <a:ext uri="{28A0092B-C50C-407E-A947-70E740481C1C}">
+                <a14:useLocalDpi xmlns:a14="http://schemas.microsoft.com/office/drawing/2010/main" val="0"/>
+              </a:ext>
+            </a:extLst>
+          </a:blip>
+          <a:srcRect l="15144" t="7280" r="9719" b="10602"/>
+          <a:stretch/>
+        </p:blipFill>
+        <p:spPr bwMode="auto">
+          <a:xfrm>
+            <a:off x="7394627" y="3410865"/>
+            <a:ext cx="1596280" cy="1163051"/>
+          </a:xfrm>
+          <a:prstGeom prst="rect">
+            <a:avLst/>
+          </a:prstGeom>
+          <a:noFill/>
+          <a:extLst>
+            <a:ext uri="{909E8E84-426E-40DD-AFC4-6F175D3DCCD1}">
+              <a14:hiddenFill xmlns:a14="http://schemas.microsoft.com/office/drawing/2010/main">
+                <a:solidFill>
+                  <a:srgbClr val="FFFFFF"/>
+                </a:solidFill>
+              </a14:hiddenFill>
+            </a:ext>
+          </a:extLst>
+        </p:spPr>
+      </p:pic>
+      <p:pic>
+        <p:nvPicPr>
+          <p:cNvPr id="10" name="Picture 6" descr="ãnVidia voltaãã®ç»åæ¤ç´¢çµæ"/>
+          <p:cNvPicPr>
+            <a:picLocks noChangeAspect="1" noChangeArrowheads="1"/>
+          </p:cNvPicPr>
+          <p:nvPr/>
+        </p:nvPicPr>
+        <p:blipFill>
+          <a:blip r:embed="rId8" cstate="print">
+            <a:extLst>
+              <a:ext uri="{28A0092B-C50C-407E-A947-70E740481C1C}">
+                <a14:useLocalDpi xmlns:a14="http://schemas.microsoft.com/office/drawing/2010/main" val="0"/>
+              </a:ext>
+            </a:extLst>
+          </a:blip>
+          <a:srcRect/>
+          <a:stretch>
+            <a:fillRect/>
+          </a:stretch>
+        </p:blipFill>
+        <p:spPr bwMode="auto">
+          <a:xfrm>
+            <a:off x="3483904" y="4274943"/>
+            <a:ext cx="1335712" cy="854856"/>
+          </a:xfrm>
+          <a:prstGeom prst="rect">
+            <a:avLst/>
+          </a:prstGeom>
+          <a:noFill/>
+          <a:extLst>
+            <a:ext uri="{909E8E84-426E-40DD-AFC4-6F175D3DCCD1}">
+              <a14:hiddenFill xmlns:a14="http://schemas.microsoft.com/office/drawing/2010/main">
+                <a:solidFill>
+                  <a:srgbClr val="FFFFFF"/>
+                </a:solidFill>
+              </a14:hiddenFill>
+            </a:ext>
+          </a:extLst>
+        </p:spPr>
+      </p:pic>
+      <p:sp>
+        <p:nvSpPr>
+          <p:cNvPr id="11" name="右矢印 10"/>
+          <p:cNvSpPr/>
+          <p:nvPr/>
+        </p:nvSpPr>
+        <p:spPr>
+          <a:xfrm>
+            <a:off x="3758464" y="1689799"/>
+            <a:ext cx="542864" cy="123108"/>
+          </a:xfrm>
+          <a:prstGeom prst="rightArrow">
+            <a:avLst/>
+          </a:prstGeom>
+        </p:spPr>
+        <p:style>
+          <a:lnRef idx="1">
+            <a:schemeClr val="accent5"/>
+          </a:lnRef>
+          <a:fillRef idx="2">
+            <a:schemeClr val="accent5"/>
+          </a:fillRef>
+          <a:effectRef idx="1">
+            <a:schemeClr val="accent5"/>
+          </a:effectRef>
+          <a:fontRef idx="minor">
+            <a:schemeClr val="dk1"/>
+          </a:fontRef>
+        </p:style>
+        <p:txBody>
+          <a:bodyPr rtlCol="0" anchor="ctr"/>
+          <a:lstStyle/>
+          <a:p>
+            <a:pPr algn="ctr"/>
+            <a:endParaRPr kumimoji="1" lang="ja-JP" altLang="en-US"/>
+          </a:p>
+        </p:txBody>
+      </p:sp>
+      <p:sp>
+        <p:nvSpPr>
+          <p:cNvPr id="12" name="右矢印 11"/>
+          <p:cNvSpPr/>
+          <p:nvPr/>
+        </p:nvSpPr>
+        <p:spPr>
+          <a:xfrm rot="2188739">
+            <a:off x="5157517" y="1914660"/>
+            <a:ext cx="452489" cy="159888"/>
+          </a:xfrm>
+          <a:prstGeom prst="rightArrow">
+            <a:avLst/>
+          </a:prstGeom>
+        </p:spPr>
+        <p:style>
+          <a:lnRef idx="1">
+            <a:schemeClr val="accent6"/>
+          </a:lnRef>
+          <a:fillRef idx="2">
+            <a:schemeClr val="accent6"/>
+          </a:fillRef>
+          <a:effectRef idx="1">
+            <a:schemeClr val="accent6"/>
+          </a:effectRef>
+          <a:fontRef idx="minor">
+            <a:schemeClr val="dk1"/>
+          </a:fontRef>
+        </p:style>
+        <p:txBody>
+          <a:bodyPr rtlCol="0" anchor="ctr"/>
+          <a:lstStyle/>
+          <a:p>
+            <a:pPr algn="ctr"/>
+            <a:endParaRPr kumimoji="1" lang="ja-JP" altLang="en-US"/>
+          </a:p>
+        </p:txBody>
+      </p:sp>
+      <p:sp>
+        <p:nvSpPr>
+          <p:cNvPr id="13" name="テキスト ボックス 12"/>
+          <p:cNvSpPr txBox="1"/>
+          <p:nvPr/>
+        </p:nvSpPr>
+        <p:spPr>
+          <a:xfrm>
+            <a:off x="2271713" y="1076615"/>
+            <a:ext cx="1212191" cy="276999"/>
+          </a:xfrm>
+          <a:prstGeom prst="rect">
+            <a:avLst/>
+          </a:prstGeom>
+          <a:noFill/>
+        </p:spPr>
+        <p:txBody>
+          <a:bodyPr wrap="none" rtlCol="0">
+            <a:spAutoFit/>
+          </a:bodyPr>
+          <a:lstStyle/>
+          <a:p>
+            <a:r>
+              <a:rPr lang="ja-JP" altLang="en-US" sz="1200" b="1" dirty="0" smtClean="0"/>
+              <a:t>教師による学習</a:t>
+            </a:r>
+            <a:endParaRPr kumimoji="1" lang="ja-JP" altLang="en-US" sz="1200" b="1" dirty="0"/>
+          </a:p>
+        </p:txBody>
+      </p:sp>
+      <p:sp>
+        <p:nvSpPr>
+          <p:cNvPr id="14" name="テキスト ボックス 13"/>
+          <p:cNvSpPr txBox="1"/>
+          <p:nvPr/>
+        </p:nvSpPr>
+        <p:spPr>
+          <a:xfrm>
+            <a:off x="4494655" y="1031531"/>
+            <a:ext cx="1045479" cy="276999"/>
+          </a:xfrm>
+          <a:prstGeom prst="rect">
+            <a:avLst/>
+          </a:prstGeom>
+          <a:noFill/>
+        </p:spPr>
+        <p:txBody>
+          <a:bodyPr wrap="none" rtlCol="0">
+            <a:spAutoFit/>
+          </a:bodyPr>
+          <a:lstStyle/>
+          <a:p>
+            <a:r>
+              <a:rPr lang="ja-JP" altLang="en-US" sz="1200" dirty="0" smtClean="0"/>
+              <a:t>推論エンジン</a:t>
+            </a:r>
+            <a:endParaRPr kumimoji="1" lang="ja-JP" altLang="en-US" sz="1200" dirty="0"/>
+          </a:p>
+        </p:txBody>
+      </p:sp>
+      <p:sp>
+        <p:nvSpPr>
+          <p:cNvPr id="15" name="テキスト ボックス 14"/>
+          <p:cNvSpPr txBox="1"/>
+          <p:nvPr/>
+        </p:nvSpPr>
+        <p:spPr>
+          <a:xfrm>
+            <a:off x="160591" y="1532493"/>
+            <a:ext cx="1088760" cy="461665"/>
+          </a:xfrm>
+          <a:prstGeom prst="rect">
+            <a:avLst/>
+          </a:prstGeom>
+          <a:noFill/>
+        </p:spPr>
+        <p:txBody>
+          <a:bodyPr wrap="none" rtlCol="0">
+            <a:spAutoFit/>
+          </a:bodyPr>
+          <a:lstStyle/>
+          <a:p>
+            <a:pPr algn="ctr"/>
+            <a:r>
+              <a:rPr lang="ja-JP" altLang="en-US" sz="1200" dirty="0" smtClean="0"/>
+              <a:t>テラ ～ ペタ級</a:t>
+            </a:r>
+            <a:endParaRPr lang="en-US" altLang="ja-JP" sz="1200" dirty="0" smtClean="0"/>
+          </a:p>
+          <a:p>
+            <a:pPr algn="ctr"/>
+            <a:r>
+              <a:rPr lang="ja-JP" altLang="en-US" sz="1200" dirty="0" smtClean="0"/>
+              <a:t>の</a:t>
+            </a:r>
+            <a:r>
+              <a:rPr lang="ja-JP" altLang="en-US" sz="1200" b="1" dirty="0" smtClean="0"/>
+              <a:t>元データ</a:t>
+            </a:r>
+            <a:endParaRPr kumimoji="1" lang="ja-JP" altLang="en-US" sz="1200" b="1" dirty="0"/>
+          </a:p>
+        </p:txBody>
+      </p:sp>
+      <p:sp>
+        <p:nvSpPr>
+          <p:cNvPr id="16" name="テキスト ボックス 15"/>
+          <p:cNvSpPr txBox="1"/>
+          <p:nvPr/>
+        </p:nvSpPr>
+        <p:spPr>
+          <a:xfrm>
+            <a:off x="3719636" y="1837201"/>
+            <a:ext cx="922047" cy="461665"/>
+          </a:xfrm>
+          <a:prstGeom prst="rect">
+            <a:avLst/>
+          </a:prstGeom>
+          <a:noFill/>
+        </p:spPr>
+        <p:txBody>
+          <a:bodyPr wrap="none" rtlCol="0">
+            <a:spAutoFit/>
+          </a:bodyPr>
+          <a:lstStyle/>
+          <a:p>
+            <a:pPr algn="ctr"/>
+            <a:r>
+              <a:rPr lang="ja-JP" altLang="en-US" sz="1200" dirty="0" smtClean="0"/>
+              <a:t>キロ級の</a:t>
+            </a:r>
+            <a:endParaRPr lang="en-US" altLang="ja-JP" sz="1200" dirty="0" smtClean="0"/>
+          </a:p>
+          <a:p>
+            <a:pPr algn="ctr"/>
+            <a:r>
+              <a:rPr kumimoji="1" lang="ja-JP" altLang="en-US" sz="1200" b="1" dirty="0" smtClean="0"/>
+              <a:t>推論データ</a:t>
+            </a:r>
+            <a:endParaRPr kumimoji="1" lang="ja-JP" altLang="en-US" sz="1200" b="1" dirty="0"/>
+          </a:p>
+        </p:txBody>
+      </p:sp>
+      <p:sp>
+        <p:nvSpPr>
+          <p:cNvPr id="17" name="テキスト ボックス 16"/>
+          <p:cNvSpPr txBox="1"/>
+          <p:nvPr/>
+        </p:nvSpPr>
+        <p:spPr>
+          <a:xfrm>
+            <a:off x="5523263" y="1624304"/>
+            <a:ext cx="1372492" cy="461665"/>
+          </a:xfrm>
+          <a:prstGeom prst="rect">
+            <a:avLst/>
+          </a:prstGeom>
+          <a:noFill/>
+        </p:spPr>
+        <p:txBody>
+          <a:bodyPr wrap="none" rtlCol="0">
+            <a:spAutoFit/>
+          </a:bodyPr>
+          <a:lstStyle/>
+          <a:p>
+            <a:pPr algn="ctr"/>
+            <a:r>
+              <a:rPr lang="ja-JP" altLang="en-US" sz="1200" dirty="0" smtClean="0"/>
+              <a:t>推論処理は</a:t>
+            </a:r>
+            <a:endParaRPr lang="en-US" altLang="ja-JP" sz="1200" dirty="0" smtClean="0"/>
+          </a:p>
+          <a:p>
+            <a:pPr algn="ctr"/>
+            <a:r>
+              <a:rPr lang="ja-JP" altLang="en-US" sz="1200" dirty="0" smtClean="0"/>
+              <a:t>軽量・リアルタイム</a:t>
+            </a:r>
+            <a:endParaRPr kumimoji="1" lang="ja-JP" altLang="en-US" sz="1200" dirty="0"/>
+          </a:p>
+        </p:txBody>
+      </p:sp>
+    </p:spTree>
+    <p:extLst>
+      <p:ext uri="{BB962C8B-B14F-4D97-AF65-F5344CB8AC3E}">
+        <p14:creationId xmlns:p14="http://schemas.microsoft.com/office/powerpoint/2010/main" val="2559184659"/>
+      </p:ext>
+    </p:extLst>
+  </p:cSld>
+  <p:clrMapOvr>
+    <a:masterClrMapping/>
+  </p:clrMapOvr>
+</p:sld>
+</file>
+
 <file path=ppt/theme/theme1.xml><?xml version="1.0" encoding="utf-8"?>
 <a:theme xmlns:a="http://schemas.openxmlformats.org/drawingml/2006/main" name="Office テーマ">
   <a:themeElements>

</xml_diff>